<commit_message>
Final draft of slides
</commit_message>
<xml_diff>
--- a/ODL_showcasepres.pptx
+++ b/ODL_showcasepres.pptx
@@ -5553,7 +5553,7 @@
         </p:spPr>
         <p:txBody>
           <a:bodyPr>
-            <a:normAutofit lnSpcReduction="10000"/>
+            <a:normAutofit fontScale="92500" lnSpcReduction="20000"/>
           </a:bodyPr>
           <a:lstStyle/>
           <a:p>
@@ -5574,6 +5574,13 @@
             <a:r>
               <a:rPr lang="en-US" sz="2800" dirty="0"/>
               <a:t>Create Binder instance for R Notebook in GitHub Repo</a:t>
+            </a:r>
+          </a:p>
+          <a:p>
+            <a:pPr lvl="1"/>
+            <a:r>
+              <a:rPr lang="en-US" sz="2800" dirty="0"/>
+              <a:t>Directed Field Work or Capstone</a:t>
             </a:r>
           </a:p>
           <a:p>

</xml_diff>